<commit_message>
Adding GDD Draft 1
</commit_message>
<xml_diff>
--- a/Documents/Five Game Ideas Presentation.pptx
+++ b/Documents/Five Game Ideas Presentation.pptx
@@ -7,10 +7,15 @@
   <p:sldIdLst>
     <p:sldId id="256" r:id="rId2"/>
     <p:sldId id="258" r:id="rId3"/>
-    <p:sldId id="259" r:id="rId4"/>
-    <p:sldId id="257" r:id="rId5"/>
-    <p:sldId id="260" r:id="rId6"/>
-    <p:sldId id="261" r:id="rId7"/>
+    <p:sldId id="262" r:id="rId4"/>
+    <p:sldId id="259" r:id="rId5"/>
+    <p:sldId id="263" r:id="rId6"/>
+    <p:sldId id="257" r:id="rId7"/>
+    <p:sldId id="264" r:id="rId8"/>
+    <p:sldId id="260" r:id="rId9"/>
+    <p:sldId id="265" r:id="rId10"/>
+    <p:sldId id="261" r:id="rId11"/>
+    <p:sldId id="266" r:id="rId12"/>
   </p:sldIdLst>
   <p:sldSz cx="12192000" cy="6858000"/>
   <p:notesSz cx="6858000" cy="9144000"/>
@@ -109,6 +114,11 @@
       </a:defRPr>
     </a:lvl9pPr>
   </p:defaultTextStyle>
+  <p:extLst>
+    <p:ext uri="{EFAFB233-063F-42B5-8137-9DF3F51BA10A}">
+      <p15:sldGuideLst xmlns:p15="http://schemas.microsoft.com/office/powerpoint/2012/main"/>
+    </p:ext>
+  </p:extLst>
 </p:presentation>
 </file>
 
@@ -243,7 +253,7 @@
           <a:p>
             <a:fld id="{121814A7-68FC-4569-997A-5396BE3A9E61}" type="datetimeFigureOut">
               <a:rPr lang="en-CA" smtClean="0"/>
-              <a:t>2025-01-09</a:t>
+              <a:t>2025-01-13</a:t>
             </a:fld>
             <a:endParaRPr lang="en-CA"/>
           </a:p>
@@ -413,7 +423,7 @@
           <a:p>
             <a:fld id="{121814A7-68FC-4569-997A-5396BE3A9E61}" type="datetimeFigureOut">
               <a:rPr lang="en-CA" smtClean="0"/>
-              <a:t>2025-01-09</a:t>
+              <a:t>2025-01-13</a:t>
             </a:fld>
             <a:endParaRPr lang="en-CA"/>
           </a:p>
@@ -593,7 +603,7 @@
           <a:p>
             <a:fld id="{121814A7-68FC-4569-997A-5396BE3A9E61}" type="datetimeFigureOut">
               <a:rPr lang="en-CA" smtClean="0"/>
-              <a:t>2025-01-09</a:t>
+              <a:t>2025-01-13</a:t>
             </a:fld>
             <a:endParaRPr lang="en-CA"/>
           </a:p>
@@ -763,7 +773,7 @@
           <a:p>
             <a:fld id="{121814A7-68FC-4569-997A-5396BE3A9E61}" type="datetimeFigureOut">
               <a:rPr lang="en-CA" smtClean="0"/>
-              <a:t>2025-01-09</a:t>
+              <a:t>2025-01-13</a:t>
             </a:fld>
             <a:endParaRPr lang="en-CA"/>
           </a:p>
@@ -1009,7 +1019,7 @@
           <a:p>
             <a:fld id="{121814A7-68FC-4569-997A-5396BE3A9E61}" type="datetimeFigureOut">
               <a:rPr lang="en-CA" smtClean="0"/>
-              <a:t>2025-01-09</a:t>
+              <a:t>2025-01-13</a:t>
             </a:fld>
             <a:endParaRPr lang="en-CA"/>
           </a:p>
@@ -1241,7 +1251,7 @@
           <a:p>
             <a:fld id="{121814A7-68FC-4569-997A-5396BE3A9E61}" type="datetimeFigureOut">
               <a:rPr lang="en-CA" smtClean="0"/>
-              <a:t>2025-01-09</a:t>
+              <a:t>2025-01-13</a:t>
             </a:fld>
             <a:endParaRPr lang="en-CA"/>
           </a:p>
@@ -1608,7 +1618,7 @@
           <a:p>
             <a:fld id="{121814A7-68FC-4569-997A-5396BE3A9E61}" type="datetimeFigureOut">
               <a:rPr lang="en-CA" smtClean="0"/>
-              <a:t>2025-01-09</a:t>
+              <a:t>2025-01-13</a:t>
             </a:fld>
             <a:endParaRPr lang="en-CA"/>
           </a:p>
@@ -1726,7 +1736,7 @@
           <a:p>
             <a:fld id="{121814A7-68FC-4569-997A-5396BE3A9E61}" type="datetimeFigureOut">
               <a:rPr lang="en-CA" smtClean="0"/>
-              <a:t>2025-01-09</a:t>
+              <a:t>2025-01-13</a:t>
             </a:fld>
             <a:endParaRPr lang="en-CA"/>
           </a:p>
@@ -1821,7 +1831,7 @@
           <a:p>
             <a:fld id="{121814A7-68FC-4569-997A-5396BE3A9E61}" type="datetimeFigureOut">
               <a:rPr lang="en-CA" smtClean="0"/>
-              <a:t>2025-01-09</a:t>
+              <a:t>2025-01-13</a:t>
             </a:fld>
             <a:endParaRPr lang="en-CA"/>
           </a:p>
@@ -2098,7 +2108,7 @@
           <a:p>
             <a:fld id="{121814A7-68FC-4569-997A-5396BE3A9E61}" type="datetimeFigureOut">
               <a:rPr lang="en-CA" smtClean="0"/>
-              <a:t>2025-01-09</a:t>
+              <a:t>2025-01-13</a:t>
             </a:fld>
             <a:endParaRPr lang="en-CA"/>
           </a:p>
@@ -2351,7 +2361,7 @@
           <a:p>
             <a:fld id="{121814A7-68FC-4569-997A-5396BE3A9E61}" type="datetimeFigureOut">
               <a:rPr lang="en-CA" smtClean="0"/>
-              <a:t>2025-01-09</a:t>
+              <a:t>2025-01-13</a:t>
             </a:fld>
             <a:endParaRPr lang="en-CA"/>
           </a:p>
@@ -2564,7 +2574,7 @@
           <a:p>
             <a:fld id="{121814A7-68FC-4569-997A-5396BE3A9E61}" type="datetimeFigureOut">
               <a:rPr lang="en-CA" smtClean="0"/>
-              <a:t>2025-01-09</a:t>
+              <a:t>2025-01-13</a:t>
             </a:fld>
             <a:endParaRPr lang="en-CA"/>
           </a:p>
@@ -2992,10 +3002,364 @@
           </a:p>
         </p:txBody>
       </p:sp>
+      <p:sp>
+        <p:nvSpPr>
+          <p:cNvPr id="3" name="Title 1"/>
+          <p:cNvSpPr txBox="1">
+            <a:spLocks/>
+          </p:cNvSpPr>
+          <p:nvPr/>
+        </p:nvSpPr>
+        <p:spPr>
+          <a:xfrm>
+            <a:off x="1524000" y="1315403"/>
+            <a:ext cx="9144000" cy="2387600"/>
+          </a:xfrm>
+          <a:prstGeom prst="rect">
+            <a:avLst/>
+          </a:prstGeom>
+        </p:spPr>
+        <p:txBody>
+          <a:bodyPr vert="horz" lIns="91440" tIns="45720" rIns="91440" bIns="45720" rtlCol="0" anchor="b">
+            <a:normAutofit/>
+          </a:bodyPr>
+          <a:lstStyle>
+            <a:lvl1pPr algn="ctr" defTabSz="914400" rtl="0" eaLnBrk="1" latinLnBrk="0" hangingPunct="1">
+              <a:lnSpc>
+                <a:spcPct val="90000"/>
+              </a:lnSpc>
+              <a:spcBef>
+                <a:spcPct val="0"/>
+              </a:spcBef>
+              <a:buNone/>
+              <a:defRPr sz="6000" kern="1200">
+                <a:solidFill>
+                  <a:schemeClr val="tx1"/>
+                </a:solidFill>
+                <a:latin typeface="+mj-lt"/>
+                <a:ea typeface="+mj-ea"/>
+                <a:cs typeface="+mj-cs"/>
+              </a:defRPr>
+            </a:lvl1pPr>
+          </a:lstStyle>
+          <a:p>
+            <a:r>
+              <a:rPr lang="en-US" sz="2000" b="1" dirty="0" smtClean="0"/>
+              <a:t>BY PAUL MARTE</a:t>
+            </a:r>
+            <a:endParaRPr lang="en-CA" sz="2000" b="1" dirty="0"/>
+          </a:p>
+        </p:txBody>
+      </p:sp>
     </p:spTree>
     <p:extLst>
       <p:ext uri="{BB962C8B-B14F-4D97-AF65-F5344CB8AC3E}">
         <p14:creationId xmlns:p14="http://schemas.microsoft.com/office/powerpoint/2010/main" val="137334549"/>
+      </p:ext>
+    </p:extLst>
+  </p:cSld>
+  <p:clrMapOvr>
+    <a:masterClrMapping/>
+  </p:clrMapOvr>
+</p:sld>
+</file>
+
+<file path=ppt/slides/slide10.xml><?xml version="1.0" encoding="utf-8"?>
+<p:sld xmlns:a="http://schemas.openxmlformats.org/drawingml/2006/main" xmlns:r="http://schemas.openxmlformats.org/officeDocument/2006/relationships" xmlns:p="http://schemas.openxmlformats.org/presentationml/2006/main">
+  <p:cSld>
+    <p:spTree>
+      <p:nvGrpSpPr>
+        <p:cNvPr id="1" name=""/>
+        <p:cNvGrpSpPr/>
+        <p:nvPr/>
+      </p:nvGrpSpPr>
+      <p:grpSpPr>
+        <a:xfrm>
+          <a:off x="0" y="0"/>
+          <a:ext cx="0" cy="0"/>
+          <a:chOff x="0" y="0"/>
+          <a:chExt cx="0" cy="0"/>
+        </a:xfrm>
+      </p:grpSpPr>
+      <p:sp>
+        <p:nvSpPr>
+          <p:cNvPr id="4" name="Rectangle 3"/>
+          <p:cNvSpPr/>
+          <p:nvPr/>
+        </p:nvSpPr>
+        <p:spPr>
+          <a:xfrm>
+            <a:off x="1786855" y="864035"/>
+            <a:ext cx="9521505" cy="4497257"/>
+          </a:xfrm>
+          <a:prstGeom prst="rect">
+            <a:avLst/>
+          </a:prstGeom>
+        </p:spPr>
+        <p:txBody>
+          <a:bodyPr wrap="square">
+            <a:spAutoFit/>
+          </a:bodyPr>
+          <a:lstStyle/>
+          <a:p>
+            <a:pPr algn="ctr">
+              <a:lnSpc>
+                <a:spcPct val="107000"/>
+              </a:lnSpc>
+              <a:spcAft>
+                <a:spcPts val="0"/>
+              </a:spcAft>
+            </a:pPr>
+            <a:r>
+              <a:rPr lang="en-CA" sz="3200" b="1" dirty="0">
+                <a:latin typeface="Calibri" panose="020F0502020204030204" pitchFamily="34" charset="0"/>
+                <a:ea typeface="Times New Roman" panose="02020603050405020304" pitchFamily="18" charset="0"/>
+                <a:cs typeface="Calibri" panose="020F0502020204030204" pitchFamily="34" charset="0"/>
+              </a:rPr>
+              <a:t>Chicken </a:t>
+            </a:r>
+            <a:r>
+              <a:rPr lang="en-CA" sz="3200" b="1" dirty="0" smtClean="0">
+                <a:latin typeface="Calibri" panose="020F0502020204030204" pitchFamily="34" charset="0"/>
+                <a:ea typeface="Times New Roman" panose="02020603050405020304" pitchFamily="18" charset="0"/>
+                <a:cs typeface="Calibri" panose="020F0502020204030204" pitchFamily="34" charset="0"/>
+              </a:rPr>
+              <a:t>Crossing</a:t>
+            </a:r>
+            <a:endParaRPr lang="en-CA" sz="3200" dirty="0">
+              <a:latin typeface="Calibri" panose="020F0502020204030204" pitchFamily="34" charset="0"/>
+              <a:ea typeface="Calibri" panose="020F0502020204030204" pitchFamily="34" charset="0"/>
+              <a:cs typeface="Times New Roman" panose="02020603050405020304" pitchFamily="18" charset="0"/>
+            </a:endParaRPr>
+          </a:p>
+          <a:p>
+            <a:pPr marL="342900" lvl="0" indent="-342900" algn="just">
+              <a:buFont typeface="Arial" panose="020B0604020202020204" pitchFamily="34" charset="0"/>
+              <a:buChar char="•"/>
+            </a:pPr>
+            <a:r>
+              <a:rPr lang="en-US" sz="2800" dirty="0" smtClean="0"/>
+              <a:t>Overview	: 	Guide </a:t>
+            </a:r>
+            <a:r>
+              <a:rPr lang="en-US" sz="2800" dirty="0"/>
+              <a:t>a chicken safely across a busy road</a:t>
+            </a:r>
+            <a:r>
+              <a:rPr lang="en-US" sz="2800" dirty="0" smtClean="0"/>
+              <a:t>.</a:t>
+            </a:r>
+            <a:endParaRPr lang="en-CA" sz="2800" dirty="0"/>
+          </a:p>
+          <a:p>
+            <a:pPr marL="342900" lvl="0" indent="-342900" algn="just">
+              <a:buFont typeface="Arial" panose="020B0604020202020204" pitchFamily="34" charset="0"/>
+              <a:buChar char="•"/>
+            </a:pPr>
+            <a:r>
+              <a:rPr lang="en-US" sz="2800" dirty="0" smtClean="0"/>
+              <a:t>Gameplay	: 	Navigate </a:t>
+            </a:r>
+            <a:r>
+              <a:rPr lang="en-US" sz="2800" dirty="0"/>
+              <a:t>traffic by moving up, down, left, or </a:t>
+            </a:r>
+            <a:r>
+              <a:rPr lang="en-US" sz="2800" dirty="0" smtClean="0"/>
+              <a:t>			right </a:t>
+            </a:r>
+            <a:r>
+              <a:rPr lang="en-US" sz="2800" dirty="0"/>
+              <a:t>to avoid vehicles</a:t>
+            </a:r>
+            <a:r>
+              <a:rPr lang="en-US" sz="2800" dirty="0" smtClean="0"/>
+              <a:t>.</a:t>
+            </a:r>
+            <a:endParaRPr lang="en-CA" sz="2800" dirty="0"/>
+          </a:p>
+          <a:p>
+            <a:pPr marL="342900" lvl="0" indent="-342900" algn="just">
+              <a:buFont typeface="Arial" panose="020B0604020202020204" pitchFamily="34" charset="0"/>
+              <a:buChar char="•"/>
+            </a:pPr>
+            <a:r>
+              <a:rPr lang="en-US" sz="2800" dirty="0" smtClean="0"/>
+              <a:t>Challenges: 	Vehicles </a:t>
+            </a:r>
+            <a:r>
+              <a:rPr lang="en-US" sz="2800" dirty="0"/>
+              <a:t>move at different speeds, with more </a:t>
+            </a:r>
+            <a:r>
+              <a:rPr lang="en-US" sz="2800" dirty="0" smtClean="0"/>
+              <a:t>			obstacles </a:t>
+            </a:r>
+            <a:r>
+              <a:rPr lang="en-US" sz="2800" dirty="0"/>
+              <a:t>in later levels.</a:t>
+            </a:r>
+            <a:endParaRPr lang="en-CA" sz="2800" dirty="0"/>
+          </a:p>
+          <a:p>
+            <a:pPr marL="342900" lvl="0" indent="-342900" algn="just">
+              <a:buFont typeface="Arial" panose="020B0604020202020204" pitchFamily="34" charset="0"/>
+              <a:buChar char="•"/>
+            </a:pPr>
+            <a:r>
+              <a:rPr lang="en-US" sz="2800" dirty="0" smtClean="0"/>
+              <a:t>Scoring	: 	Earn </a:t>
+            </a:r>
+            <a:r>
+              <a:rPr lang="en-US" sz="2800" dirty="0"/>
+              <a:t>points for successful crossings and </a:t>
+            </a:r>
+            <a:r>
+              <a:rPr lang="en-US" sz="2800" dirty="0" smtClean="0"/>
+              <a:t>				bonuses </a:t>
+            </a:r>
+            <a:r>
+              <a:rPr lang="en-US" sz="2800" dirty="0"/>
+              <a:t>for quick or flawless runs.</a:t>
+            </a:r>
+            <a:endParaRPr lang="en-CA" sz="2800" dirty="0"/>
+          </a:p>
+          <a:p>
+            <a:pPr marL="342900" lvl="0" indent="-342900" algn="just">
+              <a:buFont typeface="Arial" panose="020B0604020202020204" pitchFamily="34" charset="0"/>
+              <a:buChar char="•"/>
+            </a:pPr>
+            <a:r>
+              <a:rPr lang="en-US" sz="2800" dirty="0" smtClean="0"/>
+              <a:t>Goal	: 	Cross </a:t>
+            </a:r>
+            <a:r>
+              <a:rPr lang="en-US" sz="2800" dirty="0"/>
+              <a:t>roads, avoid hazards, and achieve the </a:t>
+            </a:r>
+            <a:r>
+              <a:rPr lang="en-US" sz="2800" dirty="0" smtClean="0"/>
+              <a:t>				highest </a:t>
+            </a:r>
+            <a:r>
+              <a:rPr lang="en-US" sz="2800" dirty="0"/>
+              <a:t>score.</a:t>
+            </a:r>
+            <a:endParaRPr lang="en-CA" sz="2800" dirty="0"/>
+          </a:p>
+        </p:txBody>
+      </p:sp>
+    </p:spTree>
+    <p:extLst>
+      <p:ext uri="{BB962C8B-B14F-4D97-AF65-F5344CB8AC3E}">
+        <p14:creationId xmlns:p14="http://schemas.microsoft.com/office/powerpoint/2010/main" val="118832490"/>
+      </p:ext>
+    </p:extLst>
+  </p:cSld>
+  <p:clrMapOvr>
+    <a:masterClrMapping/>
+  </p:clrMapOvr>
+</p:sld>
+</file>
+
+<file path=ppt/slides/slide11.xml><?xml version="1.0" encoding="utf-8"?>
+<p:sld xmlns:a="http://schemas.openxmlformats.org/drawingml/2006/main" xmlns:r="http://schemas.openxmlformats.org/officeDocument/2006/relationships" xmlns:p="http://schemas.openxmlformats.org/presentationml/2006/main">
+  <p:cSld>
+    <p:spTree>
+      <p:nvGrpSpPr>
+        <p:cNvPr id="1" name=""/>
+        <p:cNvGrpSpPr/>
+        <p:nvPr/>
+      </p:nvGrpSpPr>
+      <p:grpSpPr>
+        <a:xfrm>
+          <a:off x="0" y="0"/>
+          <a:ext cx="0" cy="0"/>
+          <a:chOff x="0" y="0"/>
+          <a:chExt cx="0" cy="0"/>
+        </a:xfrm>
+      </p:grpSpPr>
+      <p:sp>
+        <p:nvSpPr>
+          <p:cNvPr id="4" name="Rectangle 3"/>
+          <p:cNvSpPr/>
+          <p:nvPr/>
+        </p:nvSpPr>
+        <p:spPr>
+          <a:xfrm>
+            <a:off x="1786855" y="864035"/>
+            <a:ext cx="9521505" cy="595932"/>
+          </a:xfrm>
+          <a:prstGeom prst="rect">
+            <a:avLst/>
+          </a:prstGeom>
+        </p:spPr>
+        <p:txBody>
+          <a:bodyPr wrap="square">
+            <a:spAutoFit/>
+          </a:bodyPr>
+          <a:lstStyle/>
+          <a:p>
+            <a:pPr algn="ctr">
+              <a:lnSpc>
+                <a:spcPct val="107000"/>
+              </a:lnSpc>
+              <a:spcAft>
+                <a:spcPts val="0"/>
+              </a:spcAft>
+            </a:pPr>
+            <a:r>
+              <a:rPr lang="en-CA" sz="3200" b="1" dirty="0">
+                <a:latin typeface="Calibri" panose="020F0502020204030204" pitchFamily="34" charset="0"/>
+                <a:ea typeface="Times New Roman" panose="02020603050405020304" pitchFamily="18" charset="0"/>
+                <a:cs typeface="Calibri" panose="020F0502020204030204" pitchFamily="34" charset="0"/>
+              </a:rPr>
+              <a:t>Chicken </a:t>
+            </a:r>
+            <a:r>
+              <a:rPr lang="en-CA" sz="3200" b="1" dirty="0" smtClean="0">
+                <a:latin typeface="Calibri" panose="020F0502020204030204" pitchFamily="34" charset="0"/>
+                <a:ea typeface="Times New Roman" panose="02020603050405020304" pitchFamily="18" charset="0"/>
+                <a:cs typeface="Calibri" panose="020F0502020204030204" pitchFamily="34" charset="0"/>
+              </a:rPr>
+              <a:t>Crossing</a:t>
+            </a:r>
+            <a:endParaRPr lang="en-CA" sz="3200" dirty="0">
+              <a:latin typeface="Calibri" panose="020F0502020204030204" pitchFamily="34" charset="0"/>
+              <a:ea typeface="Calibri" panose="020F0502020204030204" pitchFamily="34" charset="0"/>
+              <a:cs typeface="Times New Roman" panose="02020603050405020304" pitchFamily="18" charset="0"/>
+            </a:endParaRPr>
+          </a:p>
+        </p:txBody>
+      </p:sp>
+      <p:pic>
+        <p:nvPicPr>
+          <p:cNvPr id="3" name="Picture 2"/>
+          <p:cNvPicPr>
+            <a:picLocks noChangeAspect="1"/>
+          </p:cNvPicPr>
+          <p:nvPr/>
+        </p:nvPicPr>
+        <p:blipFill>
+          <a:blip r:embed="rId2"/>
+          <a:stretch>
+            <a:fillRect/>
+          </a:stretch>
+        </p:blipFill>
+        <p:spPr>
+          <a:xfrm>
+            <a:off x="2390744" y="1545426"/>
+            <a:ext cx="8313726" cy="4550574"/>
+          </a:xfrm>
+          <a:prstGeom prst="rect">
+            <a:avLst/>
+          </a:prstGeom>
+        </p:spPr>
+      </p:pic>
+    </p:spTree>
+    <p:extLst>
+      <p:ext uri="{BB962C8B-B14F-4D97-AF65-F5344CB8AC3E}">
+        <p14:creationId xmlns:p14="http://schemas.microsoft.com/office/powerpoint/2010/main" val="1486522865"/>
       </p:ext>
     </p:extLst>
   </p:cSld>
@@ -3253,8 +3617,8 @@
         </p:nvSpPr>
         <p:spPr>
           <a:xfrm>
-            <a:off x="1459685" y="657200"/>
-            <a:ext cx="9924176" cy="4928144"/>
+            <a:off x="1140902" y="595514"/>
+            <a:ext cx="10234569" cy="915635"/>
           </a:xfrm>
           <a:prstGeom prst="rect">
             <a:avLst/>
@@ -3275,159 +3639,75 @@
               </a:spcAft>
             </a:pPr>
             <a:r>
-              <a:rPr lang="en-US" sz="3200" b="1" dirty="0">
-                <a:latin typeface="Calibri" panose="020F0502020204030204" pitchFamily="34" charset="0"/>
-                <a:ea typeface="Times New Roman" panose="02020603050405020304" pitchFamily="18" charset="0"/>
-                <a:cs typeface="Calibri" panose="020F0502020204030204" pitchFamily="34" charset="0"/>
-              </a:rPr>
-              <a:t>B</a:t>
-            </a:r>
-            <a:r>
-              <a:rPr lang="en-CA" sz="3200" b="1" dirty="0" err="1">
-                <a:latin typeface="Calibri" panose="020F0502020204030204" pitchFamily="34" charset="0"/>
-                <a:ea typeface="Times New Roman" panose="02020603050405020304" pitchFamily="18" charset="0"/>
-                <a:cs typeface="Calibri" panose="020F0502020204030204" pitchFamily="34" charset="0"/>
-              </a:rPr>
-              <a:t>ank</a:t>
-            </a:r>
-            <a:r>
               <a:rPr lang="en-CA" sz="3200" b="1" dirty="0">
                 <a:latin typeface="Calibri" panose="020F0502020204030204" pitchFamily="34" charset="0"/>
                 <a:ea typeface="Times New Roman" panose="02020603050405020304" pitchFamily="18" charset="0"/>
                 <a:cs typeface="Calibri" panose="020F0502020204030204" pitchFamily="34" charset="0"/>
               </a:rPr>
-              <a:t> Hero</a:t>
-            </a:r>
-          </a:p>
-          <a:p>
-            <a:pPr marL="342900" lvl="0" indent="-342900" algn="just">
-              <a:buFont typeface="Arial" panose="020B0604020202020204" pitchFamily="34" charset="0"/>
-              <a:buChar char="•"/>
+              <a:t>Zombie </a:t>
+            </a:r>
+            <a:r>
+              <a:rPr lang="en-CA" sz="3200" b="1" dirty="0" smtClean="0">
+                <a:latin typeface="Calibri" panose="020F0502020204030204" pitchFamily="34" charset="0"/>
+                <a:ea typeface="Times New Roman" panose="02020603050405020304" pitchFamily="18" charset="0"/>
+                <a:cs typeface="Calibri" panose="020F0502020204030204" pitchFamily="34" charset="0"/>
+              </a:rPr>
+              <a:t>Survival</a:t>
+            </a:r>
+          </a:p>
+          <a:p>
+            <a:pPr>
+              <a:lnSpc>
+                <a:spcPct val="107000"/>
+              </a:lnSpc>
+              <a:spcAft>
+                <a:spcPts val="0"/>
+              </a:spcAft>
             </a:pPr>
             <a:r>
-              <a:rPr lang="en-US" sz="2800" dirty="0" smtClean="0"/>
-              <a:t>Overview	:	Play </a:t>
-            </a:r>
-            <a:r>
-              <a:rPr lang="en-US" sz="2800" dirty="0"/>
-              <a:t>as a </a:t>
-            </a:r>
-            <a:r>
-              <a:rPr lang="en-US" sz="2800" dirty="0" smtClean="0"/>
-              <a:t>sharpshooter, </a:t>
-            </a:r>
-            <a:r>
-              <a:rPr lang="en-US" sz="2800" dirty="0"/>
-              <a:t>stopping a bank robbery </a:t>
-            </a:r>
-            <a:r>
-              <a:rPr lang="en-US" sz="2800" dirty="0" smtClean="0"/>
-              <a:t>			while </a:t>
-            </a:r>
-            <a:r>
-              <a:rPr lang="en-US" sz="2800" dirty="0"/>
-              <a:t>avoiding hostages.</a:t>
-            </a:r>
-            <a:endParaRPr lang="en-CA" sz="2800" dirty="0"/>
-          </a:p>
-          <a:p>
-            <a:pPr marL="342900" lvl="0" indent="-342900" algn="just">
-              <a:buFont typeface="Arial" panose="020B0604020202020204" pitchFamily="34" charset="0"/>
-              <a:buChar char="•"/>
-            </a:pPr>
-            <a:r>
-              <a:rPr lang="en-US" sz="2800" dirty="0" smtClean="0"/>
-              <a:t>Gameplay	: 	Aim </a:t>
-            </a:r>
-            <a:r>
-              <a:rPr lang="en-US" sz="2800" dirty="0"/>
-              <a:t>and shoot criminals; avoid hitting hostages </a:t>
-            </a:r>
-            <a:r>
-              <a:rPr lang="en-US" sz="2800" dirty="0" smtClean="0"/>
-              <a:t>			or </a:t>
-            </a:r>
-            <a:r>
-              <a:rPr lang="en-US" sz="2800" dirty="0"/>
-              <a:t>innocent people.</a:t>
-            </a:r>
-            <a:endParaRPr lang="en-CA" sz="2800" dirty="0"/>
-          </a:p>
-          <a:p>
-            <a:pPr marL="342900" lvl="0" indent="-342900" algn="just">
-              <a:buFont typeface="Arial" panose="020B0604020202020204" pitchFamily="34" charset="0"/>
-              <a:buChar char="•"/>
-            </a:pPr>
-            <a:r>
-              <a:rPr lang="en-US" sz="2800" dirty="0" smtClean="0"/>
-              <a:t>Challenges: 	Criminals </a:t>
-            </a:r>
-            <a:r>
-              <a:rPr lang="en-US" sz="2800" dirty="0"/>
-              <a:t>may use hostages as shields and </a:t>
-            </a:r>
-            <a:r>
-              <a:rPr lang="en-US" sz="2800" dirty="0" smtClean="0"/>
-              <a:t>				require </a:t>
-            </a:r>
-            <a:r>
-              <a:rPr lang="en-US" sz="2800" dirty="0"/>
-              <a:t>multiple shots to defeat.</a:t>
-            </a:r>
-            <a:endParaRPr lang="en-CA" sz="2800" dirty="0"/>
-          </a:p>
-          <a:p>
-            <a:pPr marL="342900" lvl="0" indent="-342900" algn="just">
-              <a:buFont typeface="Arial" panose="020B0604020202020204" pitchFamily="34" charset="0"/>
-              <a:buChar char="•"/>
-            </a:pPr>
-            <a:r>
-              <a:rPr lang="en-US" sz="2800" dirty="0" smtClean="0"/>
-              <a:t>Scoring	: 	Earn </a:t>
-            </a:r>
-            <a:r>
-              <a:rPr lang="en-US" sz="2800" dirty="0"/>
-              <a:t>points for stopping criminals; penalties </a:t>
-            </a:r>
-            <a:r>
-              <a:rPr lang="en-US" sz="2800" dirty="0" smtClean="0"/>
-              <a:t>			apply </a:t>
-            </a:r>
-            <a:r>
-              <a:rPr lang="en-US" sz="2800" dirty="0"/>
-              <a:t>for hitting innocents.</a:t>
-            </a:r>
-            <a:endParaRPr lang="en-CA" sz="2800" dirty="0"/>
-          </a:p>
-          <a:p>
-            <a:pPr marL="342900" lvl="0" indent="-342900" algn="just">
-              <a:buFont typeface="Arial" panose="020B0604020202020204" pitchFamily="34" charset="0"/>
-              <a:buChar char="•"/>
-            </a:pPr>
-            <a:r>
-              <a:rPr lang="en-US" sz="2800" dirty="0" smtClean="0"/>
-              <a:t>Goal	: 	Eliminate </a:t>
-            </a:r>
-            <a:r>
-              <a:rPr lang="en-US" sz="2800" dirty="0"/>
-              <a:t>criminals, avoid collateral damage, </a:t>
-            </a:r>
-            <a:r>
-              <a:rPr lang="en-US" sz="2800" dirty="0" smtClean="0"/>
-              <a:t>			and </a:t>
-            </a:r>
-            <a:r>
-              <a:rPr lang="en-US" sz="2800" dirty="0"/>
-              <a:t>achieve the highest score.</a:t>
-            </a:r>
-            <a:endParaRPr lang="en-CA" sz="2800" dirty="0"/>
-          </a:p>
-        </p:txBody>
-      </p:sp>
+              <a:rPr lang="en-CA" b="1" dirty="0" smtClean="0">
+                <a:latin typeface="Calibri" panose="020F0502020204030204" pitchFamily="34" charset="0"/>
+                <a:ea typeface="Times New Roman" panose="02020603050405020304" pitchFamily="18" charset="0"/>
+                <a:cs typeface="Calibri" panose="020F0502020204030204" pitchFamily="34" charset="0"/>
+              </a:rPr>
+              <a:t> </a:t>
+            </a:r>
+            <a:endParaRPr lang="en-CA" dirty="0">
+              <a:latin typeface="Calibri" panose="020F0502020204030204" pitchFamily="34" charset="0"/>
+              <a:ea typeface="Calibri" panose="020F0502020204030204" pitchFamily="34" charset="0"/>
+              <a:cs typeface="Times New Roman" panose="02020603050405020304" pitchFamily="18" charset="0"/>
+            </a:endParaRPr>
+          </a:p>
+        </p:txBody>
+      </p:sp>
+      <p:pic>
+        <p:nvPicPr>
+          <p:cNvPr id="3" name="Picture 2"/>
+          <p:cNvPicPr>
+            <a:picLocks noChangeAspect="1"/>
+          </p:cNvPicPr>
+          <p:nvPr/>
+        </p:nvPicPr>
+        <p:blipFill>
+          <a:blip r:embed="rId2"/>
+          <a:stretch>
+            <a:fillRect/>
+          </a:stretch>
+        </p:blipFill>
+        <p:spPr>
+          <a:xfrm>
+            <a:off x="1767893" y="1185478"/>
+            <a:ext cx="8980585" cy="5165444"/>
+          </a:xfrm>
+          <a:prstGeom prst="rect">
+            <a:avLst/>
+          </a:prstGeom>
+        </p:spPr>
+      </p:pic>
     </p:spTree>
     <p:extLst>
       <p:ext uri="{BB962C8B-B14F-4D97-AF65-F5344CB8AC3E}">
-        <p14:creationId xmlns:p14="http://schemas.microsoft.com/office/powerpoint/2010/main" val="2727422621"/>
+        <p14:creationId xmlns:p14="http://schemas.microsoft.com/office/powerpoint/2010/main" val="2340553323"/>
       </p:ext>
     </p:extLst>
   </p:cSld>
@@ -3462,8 +3742,8 @@
         </p:nvSpPr>
         <p:spPr>
           <a:xfrm>
-            <a:off x="1560353" y="592551"/>
-            <a:ext cx="9278224" cy="4928144"/>
+            <a:off x="1459685" y="657200"/>
+            <a:ext cx="9924176" cy="4928144"/>
           </a:xfrm>
           <a:prstGeom prst="rect">
             <a:avLst/>
@@ -3484,94 +3764,109 @@
               </a:spcAft>
             </a:pPr>
             <a:r>
+              <a:rPr lang="en-US" sz="3200" b="1" dirty="0">
+                <a:latin typeface="Calibri" panose="020F0502020204030204" pitchFamily="34" charset="0"/>
+                <a:ea typeface="Times New Roman" panose="02020603050405020304" pitchFamily="18" charset="0"/>
+                <a:cs typeface="Calibri" panose="020F0502020204030204" pitchFamily="34" charset="0"/>
+              </a:rPr>
+              <a:t>B</a:t>
+            </a:r>
+            <a:r>
+              <a:rPr lang="en-CA" sz="3200" b="1" dirty="0" err="1">
+                <a:latin typeface="Calibri" panose="020F0502020204030204" pitchFamily="34" charset="0"/>
+                <a:ea typeface="Times New Roman" panose="02020603050405020304" pitchFamily="18" charset="0"/>
+                <a:cs typeface="Calibri" panose="020F0502020204030204" pitchFamily="34" charset="0"/>
+              </a:rPr>
+              <a:t>ank</a:t>
+            </a:r>
+            <a:r>
               <a:rPr lang="en-CA" sz="3200" b="1" dirty="0">
                 <a:latin typeface="Calibri" panose="020F0502020204030204" pitchFamily="34" charset="0"/>
                 <a:ea typeface="Times New Roman" panose="02020603050405020304" pitchFamily="18" charset="0"/>
                 <a:cs typeface="Calibri" panose="020F0502020204030204" pitchFamily="34" charset="0"/>
               </a:rPr>
-              <a:t>Swat the Fly </a:t>
-            </a:r>
-            <a:endParaRPr lang="en-CA" sz="3200" dirty="0">
-              <a:latin typeface="Calibri" panose="020F0502020204030204" pitchFamily="34" charset="0"/>
-              <a:ea typeface="Calibri" panose="020F0502020204030204" pitchFamily="34" charset="0"/>
-              <a:cs typeface="Times New Roman" panose="02020603050405020304" pitchFamily="18" charset="0"/>
-            </a:endParaRPr>
-          </a:p>
-          <a:p>
-            <a:pPr marL="285750" lvl="0" indent="-285750" algn="just">
+              <a:t> Hero</a:t>
+            </a:r>
+          </a:p>
+          <a:p>
+            <a:pPr marL="342900" lvl="0" indent="-342900" algn="just">
               <a:buFont typeface="Arial" panose="020B0604020202020204" pitchFamily="34" charset="0"/>
               <a:buChar char="•"/>
             </a:pPr>
             <a:r>
               <a:rPr lang="en-US" sz="2800" dirty="0" smtClean="0"/>
-              <a:t>Overview	: 	Swat </a:t>
-            </a:r>
-            <a:r>
-              <a:rPr lang="en-US" sz="2800" dirty="0"/>
-              <a:t>flies buzzing unpredictably across the </a:t>
-            </a:r>
-            <a:r>
-              <a:rPr lang="en-US" sz="2800" dirty="0" smtClean="0"/>
-              <a:t>			screen</a:t>
-            </a:r>
-            <a:r>
-              <a:rPr lang="en-US" sz="2800" dirty="0"/>
-              <a:t>.</a:t>
+              <a:t>Overview	:	Play </a:t>
+            </a:r>
+            <a:r>
+              <a:rPr lang="en-US" sz="2800" dirty="0"/>
+              <a:t>as a </a:t>
+            </a:r>
+            <a:r>
+              <a:rPr lang="en-US" sz="2800" dirty="0" smtClean="0"/>
+              <a:t>sharpshooter, </a:t>
+            </a:r>
+            <a:r>
+              <a:rPr lang="en-US" sz="2800" dirty="0"/>
+              <a:t>stopping a bank robbery </a:t>
+            </a:r>
+            <a:r>
+              <a:rPr lang="en-US" sz="2800" dirty="0" smtClean="0"/>
+              <a:t>			while </a:t>
+            </a:r>
+            <a:r>
+              <a:rPr lang="en-US" sz="2800" dirty="0"/>
+              <a:t>avoiding hostages.</a:t>
             </a:r>
             <a:endParaRPr lang="en-CA" sz="2800" dirty="0"/>
           </a:p>
           <a:p>
-            <a:pPr marL="285750" lvl="0" indent="-285750" algn="just">
+            <a:pPr marL="342900" lvl="0" indent="-342900" algn="just">
               <a:buFont typeface="Arial" panose="020B0604020202020204" pitchFamily="34" charset="0"/>
               <a:buChar char="•"/>
             </a:pPr>
             <a:r>
               <a:rPr lang="en-US" sz="2800" dirty="0" smtClean="0"/>
-              <a:t>Gameplay	: 	Aim</a:t>
-            </a:r>
-            <a:r>
-              <a:rPr lang="en-US" sz="2800" dirty="0"/>
-              <a:t>, click, or tap to swat flies before they </a:t>
-            </a:r>
-            <a:r>
-              <a:rPr lang="en-US" sz="2800" dirty="0" smtClean="0"/>
-              <a:t>			escape</a:t>
-            </a:r>
-            <a:r>
-              <a:rPr lang="en-US" sz="2800" dirty="0"/>
-              <a:t>.</a:t>
+              <a:t>Gameplay	: 	Aim </a:t>
+            </a:r>
+            <a:r>
+              <a:rPr lang="en-US" sz="2800" dirty="0"/>
+              <a:t>and shoot criminals; avoid hitting hostages </a:t>
+            </a:r>
+            <a:r>
+              <a:rPr lang="en-US" sz="2800" dirty="0" smtClean="0"/>
+              <a:t>			or </a:t>
+            </a:r>
+            <a:r>
+              <a:rPr lang="en-US" sz="2800" dirty="0"/>
+              <a:t>innocent people.</a:t>
             </a:r>
             <a:endParaRPr lang="en-CA" sz="2800" dirty="0"/>
           </a:p>
           <a:p>
-            <a:pPr marL="285750" lvl="0" indent="-285750" algn="just">
+            <a:pPr marL="342900" lvl="0" indent="-342900" algn="just">
               <a:buFont typeface="Arial" panose="020B0604020202020204" pitchFamily="34" charset="0"/>
               <a:buChar char="•"/>
             </a:pPr>
             <a:r>
-              <a:rPr lang="en-US" sz="2800" dirty="0"/>
-              <a:t>Challenges: </a:t>
-            </a:r>
-            <a:r>
-              <a:rPr lang="en-US" sz="2800" dirty="0" smtClean="0"/>
-              <a:t>	Flies </a:t>
-            </a:r>
-            <a:r>
-              <a:rPr lang="en-US" sz="2800" dirty="0"/>
-              <a:t>become faster and more erratic with </a:t>
-            </a:r>
-            <a:r>
-              <a:rPr lang="en-US" sz="2800" dirty="0" smtClean="0"/>
-              <a:t>			each </a:t>
-            </a:r>
-            <a:r>
-              <a:rPr lang="en-US" sz="2800" dirty="0"/>
-              <a:t>level.</a:t>
+              <a:rPr lang="en-US" sz="2800" dirty="0" smtClean="0"/>
+              <a:t>Challenges: 	Criminals </a:t>
+            </a:r>
+            <a:r>
+              <a:rPr lang="en-US" sz="2800" dirty="0"/>
+              <a:t>may use hostages as shields and </a:t>
+            </a:r>
+            <a:r>
+              <a:rPr lang="en-US" sz="2800" dirty="0" smtClean="0"/>
+              <a:t>				require </a:t>
+            </a:r>
+            <a:r>
+              <a:rPr lang="en-US" sz="2800" dirty="0"/>
+              <a:t>multiple shots to defeat.</a:t>
             </a:r>
             <a:endParaRPr lang="en-CA" sz="2800" dirty="0"/>
           </a:p>
           <a:p>
-            <a:pPr marL="285750" lvl="0" indent="-285750" algn="just">
+            <a:pPr marL="342900" lvl="0" indent="-342900" algn="just">
               <a:buFont typeface="Arial" panose="020B0604020202020204" pitchFamily="34" charset="0"/>
               <a:buChar char="•"/>
             </a:pPr>
@@ -3581,38 +3876,38 @@
             </a:r>
             <a:r>
               <a:rPr lang="en-US" sz="2800" dirty="0"/>
-              <a:t>points for swatting flies; penalties for </a:t>
-            </a:r>
-            <a:r>
-              <a:rPr lang="en-US" sz="2800" dirty="0" smtClean="0"/>
-              <a:t>			missing </a:t>
-            </a:r>
-            <a:r>
-              <a:rPr lang="en-US" sz="2800" dirty="0"/>
-              <a:t>or hitting obstacles.</a:t>
+              <a:t>points for stopping criminals; penalties </a:t>
+            </a:r>
+            <a:r>
+              <a:rPr lang="en-US" sz="2800" dirty="0" smtClean="0"/>
+              <a:t>			apply </a:t>
+            </a:r>
+            <a:r>
+              <a:rPr lang="en-US" sz="2800" dirty="0"/>
+              <a:t>for hitting innocents.</a:t>
             </a:r>
             <a:endParaRPr lang="en-CA" sz="2800" dirty="0"/>
           </a:p>
           <a:p>
-            <a:pPr marL="285750" lvl="0" indent="-285750" algn="just">
+            <a:pPr marL="342900" lvl="0" indent="-342900" algn="just">
               <a:buFont typeface="Arial" panose="020B0604020202020204" pitchFamily="34" charset="0"/>
               <a:buChar char="•"/>
             </a:pPr>
             <a:r>
               <a:rPr lang="en-US" sz="2800" dirty="0" smtClean="0"/>
-              <a:t>Goal	: 	Swat </a:t>
-            </a:r>
-            <a:r>
-              <a:rPr lang="en-US" sz="2800" dirty="0"/>
-              <a:t>as many flies as possible and achieve </a:t>
-            </a:r>
-            <a:r>
-              <a:rPr lang="en-US" sz="2800" dirty="0" smtClean="0"/>
-              <a:t>			the </a:t>
-            </a:r>
-            <a:r>
-              <a:rPr lang="en-US" sz="2800" dirty="0"/>
-              <a:t>highest score.</a:t>
+              <a:t>Goal	: 	Eliminate </a:t>
+            </a:r>
+            <a:r>
+              <a:rPr lang="en-US" sz="2800" dirty="0"/>
+              <a:t>criminals, avoid collateral damage, </a:t>
+            </a:r>
+            <a:r>
+              <a:rPr lang="en-US" sz="2800" dirty="0" smtClean="0"/>
+              <a:t>			and </a:t>
+            </a:r>
+            <a:r>
+              <a:rPr lang="en-US" sz="2800" dirty="0"/>
+              <a:t>achieve the highest score.</a:t>
             </a:r>
             <a:endParaRPr lang="en-CA" sz="2800" dirty="0"/>
           </a:p>
@@ -3621,7 +3916,7 @@
     </p:spTree>
     <p:extLst>
       <p:ext uri="{BB962C8B-B14F-4D97-AF65-F5344CB8AC3E}">
-        <p14:creationId xmlns:p14="http://schemas.microsoft.com/office/powerpoint/2010/main" val="1102554950"/>
+        <p14:creationId xmlns:p14="http://schemas.microsoft.com/office/powerpoint/2010/main" val="2727422621"/>
       </p:ext>
     </p:extLst>
   </p:cSld>
@@ -3656,8 +3951,8 @@
         </p:nvSpPr>
         <p:spPr>
           <a:xfrm>
-            <a:off x="1680594" y="539653"/>
-            <a:ext cx="9308983" cy="4928144"/>
+            <a:off x="1459685" y="657200"/>
+            <a:ext cx="9924176" cy="595932"/>
           </a:xfrm>
           <a:prstGeom prst="rect">
             <a:avLst/>
@@ -3678,142 +3973,73 @@
               </a:spcAft>
             </a:pPr>
             <a:r>
-              <a:rPr lang="en-CA" sz="3200" b="1" dirty="0" smtClean="0">
-                <a:effectLst/>
+              <a:rPr lang="en-US" sz="3200" b="1" dirty="0">
                 <a:latin typeface="Calibri" panose="020F0502020204030204" pitchFamily="34" charset="0"/>
                 <a:ea typeface="Times New Roman" panose="02020603050405020304" pitchFamily="18" charset="0"/>
                 <a:cs typeface="Calibri" panose="020F0502020204030204" pitchFamily="34" charset="0"/>
               </a:rPr>
-              <a:t>Independence Day</a:t>
-            </a:r>
-            <a:endParaRPr lang="en-CA" sz="3200" dirty="0" smtClean="0">
-              <a:effectLst/>
+              <a:t>B</a:t>
+            </a:r>
+            <a:r>
+              <a:rPr lang="en-CA" sz="3200" b="1" dirty="0" err="1">
+                <a:latin typeface="Calibri" panose="020F0502020204030204" pitchFamily="34" charset="0"/>
+                <a:ea typeface="Times New Roman" panose="02020603050405020304" pitchFamily="18" charset="0"/>
+                <a:cs typeface="Calibri" panose="020F0502020204030204" pitchFamily="34" charset="0"/>
+              </a:rPr>
+              <a:t>ank</a:t>
+            </a:r>
+            <a:r>
+              <a:rPr lang="en-CA" sz="3200" b="1" dirty="0">
+                <a:latin typeface="Calibri" panose="020F0502020204030204" pitchFamily="34" charset="0"/>
+                <a:ea typeface="Times New Roman" panose="02020603050405020304" pitchFamily="18" charset="0"/>
+                <a:cs typeface="Calibri" panose="020F0502020204030204" pitchFamily="34" charset="0"/>
+              </a:rPr>
+              <a:t> </a:t>
+            </a:r>
+            <a:r>
+              <a:rPr lang="en-CA" sz="3200" b="1" dirty="0" smtClean="0">
+                <a:latin typeface="Calibri" panose="020F0502020204030204" pitchFamily="34" charset="0"/>
+                <a:ea typeface="Times New Roman" panose="02020603050405020304" pitchFamily="18" charset="0"/>
+                <a:cs typeface="Calibri" panose="020F0502020204030204" pitchFamily="34" charset="0"/>
+              </a:rPr>
+              <a:t>Hero</a:t>
+            </a:r>
+            <a:endParaRPr lang="en-CA" sz="3200" b="1" dirty="0">
               <a:latin typeface="Calibri" panose="020F0502020204030204" pitchFamily="34" charset="0"/>
-              <a:ea typeface="Calibri" panose="020F0502020204030204" pitchFamily="34" charset="0"/>
-              <a:cs typeface="Times New Roman" panose="02020603050405020304" pitchFamily="18" charset="0"/>
+              <a:ea typeface="Times New Roman" panose="02020603050405020304" pitchFamily="18" charset="0"/>
+              <a:cs typeface="Calibri" panose="020F0502020204030204" pitchFamily="34" charset="0"/>
             </a:endParaRPr>
           </a:p>
-          <a:p>
-            <a:pPr marL="285750" lvl="0" indent="-285750" algn="just">
-              <a:buFont typeface="Arial" panose="020B0604020202020204" pitchFamily="34" charset="0"/>
-              <a:buChar char="•"/>
-            </a:pPr>
-            <a:r>
-              <a:rPr lang="en-US" sz="2800" dirty="0" smtClean="0"/>
-              <a:t>Overview	:	Defend </a:t>
-            </a:r>
-            <a:r>
-              <a:rPr lang="en-US" sz="2800" dirty="0"/>
-              <a:t>Earth from alien invasions in a </a:t>
-            </a:r>
-            <a:r>
-              <a:rPr lang="en-US" sz="2800" dirty="0" smtClean="0"/>
-              <a:t>			spaceship</a:t>
-            </a:r>
-            <a:r>
-              <a:rPr lang="en-US" sz="2800" dirty="0"/>
-              <a:t>.</a:t>
-            </a:r>
-            <a:endParaRPr lang="en-CA" sz="2800" dirty="0"/>
-          </a:p>
-          <a:p>
-            <a:pPr marL="285750" lvl="0" indent="-285750" algn="just">
-              <a:buFont typeface="Arial" panose="020B0604020202020204" pitchFamily="34" charset="0"/>
-              <a:buChar char="•"/>
-            </a:pPr>
-            <a:r>
-              <a:rPr lang="en-US" sz="2800" dirty="0" smtClean="0"/>
-              <a:t>Gameplay	: 	Move </a:t>
-            </a:r>
-            <a:r>
-              <a:rPr lang="en-US" sz="2800" dirty="0"/>
-              <a:t>left and right, shooting alien ships </a:t>
-            </a:r>
-            <a:r>
-              <a:rPr lang="en-US" sz="2800" dirty="0" smtClean="0"/>
-              <a:t>			before </a:t>
-            </a:r>
-            <a:r>
-              <a:rPr lang="en-US" sz="2800" dirty="0"/>
-              <a:t>they reach the planet.</a:t>
-            </a:r>
-            <a:endParaRPr lang="en-CA" sz="2800" dirty="0"/>
-          </a:p>
-          <a:p>
-            <a:pPr marL="285750" lvl="0" indent="-285750" algn="just">
-              <a:buFont typeface="Arial" panose="020B0604020202020204" pitchFamily="34" charset="0"/>
-              <a:buChar char="•"/>
-            </a:pPr>
-            <a:r>
-              <a:rPr lang="en-US" sz="2800" dirty="0" smtClean="0"/>
-              <a:t>Challenges: 	Aliens </a:t>
-            </a:r>
-            <a:r>
-              <a:rPr lang="en-US" sz="2800" dirty="0"/>
-              <a:t>get faster, fire back, and drop </a:t>
-            </a:r>
-            <a:r>
-              <a:rPr lang="en-US" sz="2800" dirty="0" smtClean="0"/>
-              <a:t>power-			ups </a:t>
-            </a:r>
-            <a:r>
-              <a:rPr lang="en-US" sz="2800" dirty="0"/>
-              <a:t>like shields or bombs.</a:t>
-            </a:r>
-            <a:endParaRPr lang="en-CA" sz="2800" dirty="0"/>
-          </a:p>
-          <a:p>
-            <a:pPr marL="285750" lvl="0" indent="-285750" algn="just">
-              <a:buFont typeface="Arial" panose="020B0604020202020204" pitchFamily="34" charset="0"/>
-              <a:buChar char="•"/>
-            </a:pPr>
-            <a:r>
-              <a:rPr lang="en-US" sz="2800" dirty="0" smtClean="0"/>
-              <a:t>Scoring	: 	Earn </a:t>
-            </a:r>
-            <a:r>
-              <a:rPr lang="en-US" sz="2800" dirty="0"/>
-              <a:t>points for destroying ships and </a:t>
-            </a:r>
-            <a:r>
-              <a:rPr lang="en-US" sz="2800" dirty="0" smtClean="0"/>
-              <a:t>				completing </a:t>
-            </a:r>
-            <a:r>
-              <a:rPr lang="en-US" sz="2800" dirty="0"/>
-              <a:t>waves quickly.</a:t>
-            </a:r>
-            <a:endParaRPr lang="en-CA" sz="2800" dirty="0"/>
-          </a:p>
-          <a:p>
-            <a:pPr marL="285750" lvl="0" indent="-285750" algn="just">
-              <a:buFont typeface="Arial" panose="020B0604020202020204" pitchFamily="34" charset="0"/>
-              <a:buChar char="•"/>
-            </a:pPr>
-            <a:r>
-              <a:rPr lang="en-US" sz="2800" dirty="0" smtClean="0"/>
-              <a:t>Goal	: 	Survive </a:t>
-            </a:r>
-            <a:r>
-              <a:rPr lang="en-US" sz="2800" dirty="0"/>
-              <a:t>waves, protect Earth, and achieve </a:t>
-            </a:r>
-            <a:r>
-              <a:rPr lang="en-US" sz="2800" dirty="0" smtClean="0"/>
-              <a:t>			the </a:t>
-            </a:r>
-            <a:r>
-              <a:rPr lang="en-US" sz="2800" dirty="0"/>
-              <a:t>highest score.</a:t>
-            </a:r>
-            <a:endParaRPr lang="en-CA" sz="2800" dirty="0"/>
-          </a:p>
-        </p:txBody>
-      </p:sp>
+        </p:txBody>
+      </p:sp>
+      <p:pic>
+        <p:nvPicPr>
+          <p:cNvPr id="3" name="Picture 2"/>
+          <p:cNvPicPr>
+            <a:picLocks noChangeAspect="1"/>
+          </p:cNvPicPr>
+          <p:nvPr/>
+        </p:nvPicPr>
+        <p:blipFill>
+          <a:blip r:embed="rId2"/>
+          <a:stretch>
+            <a:fillRect/>
+          </a:stretch>
+        </p:blipFill>
+        <p:spPr>
+          <a:xfrm>
+            <a:off x="2073158" y="1332993"/>
+            <a:ext cx="8344623" cy="4930567"/>
+          </a:xfrm>
+          <a:prstGeom prst="rect">
+            <a:avLst/>
+          </a:prstGeom>
+        </p:spPr>
+      </p:pic>
     </p:spTree>
     <p:extLst>
       <p:ext uri="{BB962C8B-B14F-4D97-AF65-F5344CB8AC3E}">
-        <p14:creationId xmlns:p14="http://schemas.microsoft.com/office/powerpoint/2010/main" val="2581456538"/>
+        <p14:creationId xmlns:p14="http://schemas.microsoft.com/office/powerpoint/2010/main" val="2244857504"/>
       </p:ext>
     </p:extLst>
   </p:cSld>
@@ -3848,8 +4074,8 @@
         </p:nvSpPr>
         <p:spPr>
           <a:xfrm>
-            <a:off x="1786855" y="864035"/>
-            <a:ext cx="9521505" cy="4497257"/>
+            <a:off x="1560353" y="592551"/>
+            <a:ext cx="9278224" cy="4928144"/>
           </a:xfrm>
           <a:prstGeom prst="rect">
             <a:avLst/>
@@ -3875,15 +4101,7 @@
                 <a:ea typeface="Times New Roman" panose="02020603050405020304" pitchFamily="18" charset="0"/>
                 <a:cs typeface="Calibri" panose="020F0502020204030204" pitchFamily="34" charset="0"/>
               </a:rPr>
-              <a:t>Chicken </a:t>
-            </a:r>
-            <a:r>
-              <a:rPr lang="en-CA" sz="3200" b="1" dirty="0" smtClean="0">
-                <a:latin typeface="Calibri" panose="020F0502020204030204" pitchFamily="34" charset="0"/>
-                <a:ea typeface="Times New Roman" panose="02020603050405020304" pitchFamily="18" charset="0"/>
-                <a:cs typeface="Calibri" panose="020F0502020204030204" pitchFamily="34" charset="0"/>
-              </a:rPr>
-              <a:t>Crossing</a:t>
+              <a:t>Swat the Fly </a:t>
             </a:r>
             <a:endParaRPr lang="en-CA" sz="3200" dirty="0">
               <a:latin typeface="Calibri" panose="020F0502020204030204" pitchFamily="34" charset="0"/>
@@ -3892,76 +4110,80 @@
             </a:endParaRPr>
           </a:p>
           <a:p>
-            <a:pPr marL="342900" lvl="0" indent="-342900" algn="just">
+            <a:pPr marL="285750" lvl="0" indent="-285750" algn="just">
               <a:buFont typeface="Arial" panose="020B0604020202020204" pitchFamily="34" charset="0"/>
               <a:buChar char="•"/>
             </a:pPr>
             <a:r>
               <a:rPr lang="en-US" sz="2800" dirty="0" smtClean="0"/>
-              <a:t>Overview	: 	Guide </a:t>
-            </a:r>
-            <a:r>
-              <a:rPr lang="en-US" sz="2800" dirty="0"/>
-              <a:t>a chicken safely across a busy road</a:t>
-            </a:r>
-            <a:r>
-              <a:rPr lang="en-US" sz="2800" dirty="0" smtClean="0"/>
+              <a:t>Overview	: 	Swat </a:t>
+            </a:r>
+            <a:r>
+              <a:rPr lang="en-US" sz="2800" dirty="0"/>
+              <a:t>flies buzzing unpredictably across the </a:t>
+            </a:r>
+            <a:r>
+              <a:rPr lang="en-US" sz="2800" dirty="0" smtClean="0"/>
+              <a:t>			screen</a:t>
+            </a:r>
+            <a:r>
+              <a:rPr lang="en-US" sz="2800" dirty="0"/>
               <a:t>.</a:t>
             </a:r>
             <a:endParaRPr lang="en-CA" sz="2800" dirty="0"/>
           </a:p>
           <a:p>
-            <a:pPr marL="342900" lvl="0" indent="-342900" algn="just">
+            <a:pPr marL="285750" lvl="0" indent="-285750" algn="just">
               <a:buFont typeface="Arial" panose="020B0604020202020204" pitchFamily="34" charset="0"/>
               <a:buChar char="•"/>
             </a:pPr>
             <a:r>
               <a:rPr lang="en-US" sz="2800" dirty="0" smtClean="0"/>
-              <a:t>Gameplay	: 	Navigate </a:t>
-            </a:r>
-            <a:r>
-              <a:rPr lang="en-US" sz="2800" dirty="0"/>
-              <a:t>traffic by moving up, down, left, or </a:t>
-            </a:r>
-            <a:r>
-              <a:rPr lang="en-US" sz="2800" dirty="0" smtClean="0"/>
-              <a:t>			right </a:t>
-            </a:r>
-            <a:r>
-              <a:rPr lang="en-US" sz="2800" dirty="0"/>
-              <a:t>to avoid vehicles</a:t>
-            </a:r>
-            <a:r>
-              <a:rPr lang="en-US" sz="2800" dirty="0" smtClean="0"/>
+              <a:t>Gameplay	: 	Aim</a:t>
+            </a:r>
+            <a:r>
+              <a:rPr lang="en-US" sz="2800" dirty="0"/>
+              <a:t>, click, or tap to swat flies before they </a:t>
+            </a:r>
+            <a:r>
+              <a:rPr lang="en-US" sz="2800" dirty="0" smtClean="0"/>
+              <a:t>			escape</a:t>
+            </a:r>
+            <a:r>
+              <a:rPr lang="en-US" sz="2800" dirty="0"/>
               <a:t>.</a:t>
             </a:r>
             <a:endParaRPr lang="en-CA" sz="2800" dirty="0"/>
           </a:p>
           <a:p>
-            <a:pPr marL="342900" lvl="0" indent="-342900" algn="just">
+            <a:pPr marL="285750" lvl="0" indent="-285750" algn="just">
               <a:buFont typeface="Arial" panose="020B0604020202020204" pitchFamily="34" charset="0"/>
               <a:buChar char="•"/>
             </a:pPr>
             <a:r>
-              <a:rPr lang="en-US" sz="2800" dirty="0" smtClean="0"/>
-              <a:t>Challenges: 	Vehicles </a:t>
-            </a:r>
-            <a:r>
-              <a:rPr lang="en-US" sz="2800" dirty="0"/>
-              <a:t>move at different speeds, with more </a:t>
-            </a:r>
-            <a:r>
-              <a:rPr lang="en-US" sz="2800" dirty="0" smtClean="0"/>
-              <a:t>			obstacles </a:t>
-            </a:r>
-            <a:r>
-              <a:rPr lang="en-US" sz="2800" dirty="0"/>
-              <a:t>in later levels.</a:t>
+              <a:rPr lang="en-US" sz="2800" dirty="0"/>
+              <a:t>Challenges: </a:t>
+            </a:r>
+            <a:r>
+              <a:rPr lang="en-US" sz="2800" dirty="0" smtClean="0"/>
+              <a:t>	Flies </a:t>
+            </a:r>
+            <a:r>
+              <a:rPr lang="en-US" sz="2800" dirty="0"/>
+              <a:t>become faster and more erratic with </a:t>
+            </a:r>
+            <a:r>
+              <a:rPr lang="en-US" sz="2800" dirty="0" smtClean="0"/>
+              <a:t>			each </a:t>
+            </a:r>
+            <a:r>
+              <a:rPr lang="en-US" sz="2800" dirty="0"/>
+              <a:t>level.</a:t>
             </a:r>
             <a:endParaRPr lang="en-CA" sz="2800" dirty="0"/>
           </a:p>
           <a:p>
-            <a:pPr marL="342900" lvl="0" indent="-342900" algn="just">
+            <a:pPr marL="285750" lvl="0" indent="-285750" algn="just">
               <a:buFont typeface="Arial" panose="020B0604020202020204" pitchFamily="34" charset="0"/>
               <a:buChar char="•"/>
             </a:pPr>
@@ -3971,38 +4193,38 @@
             </a:r>
             <a:r>
               <a:rPr lang="en-US" sz="2800" dirty="0"/>
-              <a:t>points for successful crossings and </a:t>
-            </a:r>
-            <a:r>
-              <a:rPr lang="en-US" sz="2800" dirty="0" smtClean="0"/>
-              <a:t>				bonuses </a:t>
-            </a:r>
-            <a:r>
-              <a:rPr lang="en-US" sz="2800" dirty="0"/>
-              <a:t>for quick or flawless runs.</a:t>
+              <a:t>points for swatting flies; penalties for </a:t>
+            </a:r>
+            <a:r>
+              <a:rPr lang="en-US" sz="2800" dirty="0" smtClean="0"/>
+              <a:t>			missing </a:t>
+            </a:r>
+            <a:r>
+              <a:rPr lang="en-US" sz="2800" dirty="0"/>
+              <a:t>or hitting obstacles.</a:t>
             </a:r>
             <a:endParaRPr lang="en-CA" sz="2800" dirty="0"/>
           </a:p>
           <a:p>
-            <a:pPr marL="342900" lvl="0" indent="-342900" algn="just">
+            <a:pPr marL="285750" lvl="0" indent="-285750" algn="just">
               <a:buFont typeface="Arial" panose="020B0604020202020204" pitchFamily="34" charset="0"/>
               <a:buChar char="•"/>
             </a:pPr>
             <a:r>
               <a:rPr lang="en-US" sz="2800" dirty="0" smtClean="0"/>
-              <a:t>Goal	: 	Cross </a:t>
-            </a:r>
-            <a:r>
-              <a:rPr lang="en-US" sz="2800" dirty="0"/>
-              <a:t>roads, avoid hazards, and achieve the </a:t>
-            </a:r>
-            <a:r>
-              <a:rPr lang="en-US" sz="2800" dirty="0" smtClean="0"/>
-              <a:t>				highest </a:t>
-            </a:r>
-            <a:r>
-              <a:rPr lang="en-US" sz="2800" dirty="0"/>
-              <a:t>score.</a:t>
+              <a:t>Goal	: 	Swat </a:t>
+            </a:r>
+            <a:r>
+              <a:rPr lang="en-US" sz="2800" dirty="0"/>
+              <a:t>as many flies as possible and achieve </a:t>
+            </a:r>
+            <a:r>
+              <a:rPr lang="en-US" sz="2800" dirty="0" smtClean="0"/>
+              <a:t>			the </a:t>
+            </a:r>
+            <a:r>
+              <a:rPr lang="en-US" sz="2800" dirty="0"/>
+              <a:t>highest score.</a:t>
             </a:r>
             <a:endParaRPr lang="en-CA" sz="2800" dirty="0"/>
           </a:p>
@@ -4011,13 +4233,433 @@
     </p:spTree>
     <p:extLst>
       <p:ext uri="{BB962C8B-B14F-4D97-AF65-F5344CB8AC3E}">
-        <p14:creationId xmlns:p14="http://schemas.microsoft.com/office/powerpoint/2010/main" val="118832490"/>
+        <p14:creationId xmlns:p14="http://schemas.microsoft.com/office/powerpoint/2010/main" val="1102554950"/>
       </p:ext>
     </p:extLst>
   </p:cSld>
   <p:clrMapOvr>
     <a:masterClrMapping/>
   </p:clrMapOvr>
+  <p:timing>
+    <p:tnLst>
+      <p:par>
+        <p:cTn id="1" dur="indefinite" restart="never" nodeType="tmRoot"/>
+      </p:par>
+    </p:tnLst>
+  </p:timing>
+</p:sld>
+</file>
+
+<file path=ppt/slides/slide7.xml><?xml version="1.0" encoding="utf-8"?>
+<p:sld xmlns:a="http://schemas.openxmlformats.org/drawingml/2006/main" xmlns:r="http://schemas.openxmlformats.org/officeDocument/2006/relationships" xmlns:p="http://schemas.openxmlformats.org/presentationml/2006/main">
+  <p:cSld>
+    <p:spTree>
+      <p:nvGrpSpPr>
+        <p:cNvPr id="1" name=""/>
+        <p:cNvGrpSpPr/>
+        <p:nvPr/>
+      </p:nvGrpSpPr>
+      <p:grpSpPr>
+        <a:xfrm>
+          <a:off x="0" y="0"/>
+          <a:ext cx="0" cy="0"/>
+          <a:chOff x="0" y="0"/>
+          <a:chExt cx="0" cy="0"/>
+        </a:xfrm>
+      </p:grpSpPr>
+      <p:sp>
+        <p:nvSpPr>
+          <p:cNvPr id="4" name="Rectangle 3"/>
+          <p:cNvSpPr/>
+          <p:nvPr/>
+        </p:nvSpPr>
+        <p:spPr>
+          <a:xfrm>
+            <a:off x="1560353" y="592551"/>
+            <a:ext cx="9278224" cy="595932"/>
+          </a:xfrm>
+          <a:prstGeom prst="rect">
+            <a:avLst/>
+          </a:prstGeom>
+        </p:spPr>
+        <p:txBody>
+          <a:bodyPr wrap="square">
+            <a:spAutoFit/>
+          </a:bodyPr>
+          <a:lstStyle/>
+          <a:p>
+            <a:pPr algn="ctr">
+              <a:lnSpc>
+                <a:spcPct val="107000"/>
+              </a:lnSpc>
+              <a:spcAft>
+                <a:spcPts val="0"/>
+              </a:spcAft>
+            </a:pPr>
+            <a:r>
+              <a:rPr lang="en-CA" sz="3200" b="1" dirty="0">
+                <a:latin typeface="Calibri" panose="020F0502020204030204" pitchFamily="34" charset="0"/>
+                <a:ea typeface="Times New Roman" panose="02020603050405020304" pitchFamily="18" charset="0"/>
+                <a:cs typeface="Calibri" panose="020F0502020204030204" pitchFamily="34" charset="0"/>
+              </a:rPr>
+              <a:t>Swat the Fly </a:t>
+            </a:r>
+            <a:endParaRPr lang="en-CA" sz="3200" dirty="0">
+              <a:latin typeface="Calibri" panose="020F0502020204030204" pitchFamily="34" charset="0"/>
+              <a:ea typeface="Calibri" panose="020F0502020204030204" pitchFamily="34" charset="0"/>
+              <a:cs typeface="Times New Roman" panose="02020603050405020304" pitchFamily="18" charset="0"/>
+            </a:endParaRPr>
+          </a:p>
+        </p:txBody>
+      </p:sp>
+      <p:pic>
+        <p:nvPicPr>
+          <p:cNvPr id="2" name="Picture 1"/>
+          <p:cNvPicPr>
+            <a:picLocks noChangeAspect="1"/>
+          </p:cNvPicPr>
+          <p:nvPr/>
+        </p:nvPicPr>
+        <p:blipFill>
+          <a:blip r:embed="rId2"/>
+          <a:stretch>
+            <a:fillRect/>
+          </a:stretch>
+        </p:blipFill>
+        <p:spPr>
+          <a:xfrm>
+            <a:off x="2378004" y="1585961"/>
+            <a:ext cx="7277731" cy="3932261"/>
+          </a:xfrm>
+          <a:prstGeom prst="rect">
+            <a:avLst/>
+          </a:prstGeom>
+        </p:spPr>
+      </p:pic>
+    </p:spTree>
+    <p:extLst>
+      <p:ext uri="{BB962C8B-B14F-4D97-AF65-F5344CB8AC3E}">
+        <p14:creationId xmlns:p14="http://schemas.microsoft.com/office/powerpoint/2010/main" val="4111439695"/>
+      </p:ext>
+    </p:extLst>
+  </p:cSld>
+  <p:clrMapOvr>
+    <a:masterClrMapping/>
+  </p:clrMapOvr>
+  <p:timing>
+    <p:tnLst>
+      <p:par>
+        <p:cTn id="1" dur="indefinite" restart="never" nodeType="tmRoot"/>
+      </p:par>
+    </p:tnLst>
+  </p:timing>
+</p:sld>
+</file>
+
+<file path=ppt/slides/slide8.xml><?xml version="1.0" encoding="utf-8"?>
+<p:sld xmlns:a="http://schemas.openxmlformats.org/drawingml/2006/main" xmlns:r="http://schemas.openxmlformats.org/officeDocument/2006/relationships" xmlns:p="http://schemas.openxmlformats.org/presentationml/2006/main">
+  <p:cSld>
+    <p:spTree>
+      <p:nvGrpSpPr>
+        <p:cNvPr id="1" name=""/>
+        <p:cNvGrpSpPr/>
+        <p:nvPr/>
+      </p:nvGrpSpPr>
+      <p:grpSpPr>
+        <a:xfrm>
+          <a:off x="0" y="0"/>
+          <a:ext cx="0" cy="0"/>
+          <a:chOff x="0" y="0"/>
+          <a:chExt cx="0" cy="0"/>
+        </a:xfrm>
+      </p:grpSpPr>
+      <p:sp>
+        <p:nvSpPr>
+          <p:cNvPr id="4" name="Rectangle 3"/>
+          <p:cNvSpPr/>
+          <p:nvPr/>
+        </p:nvSpPr>
+        <p:spPr>
+          <a:xfrm>
+            <a:off x="1680594" y="539653"/>
+            <a:ext cx="9308983" cy="4928144"/>
+          </a:xfrm>
+          <a:prstGeom prst="rect">
+            <a:avLst/>
+          </a:prstGeom>
+        </p:spPr>
+        <p:txBody>
+          <a:bodyPr wrap="square">
+            <a:spAutoFit/>
+          </a:bodyPr>
+          <a:lstStyle/>
+          <a:p>
+            <a:pPr algn="ctr">
+              <a:lnSpc>
+                <a:spcPct val="107000"/>
+              </a:lnSpc>
+              <a:spcAft>
+                <a:spcPts val="0"/>
+              </a:spcAft>
+            </a:pPr>
+            <a:r>
+              <a:rPr lang="en-CA" sz="3200" b="1" dirty="0" smtClean="0">
+                <a:effectLst/>
+                <a:latin typeface="Calibri" panose="020F0502020204030204" pitchFamily="34" charset="0"/>
+                <a:ea typeface="Times New Roman" panose="02020603050405020304" pitchFamily="18" charset="0"/>
+                <a:cs typeface="Calibri" panose="020F0502020204030204" pitchFamily="34" charset="0"/>
+              </a:rPr>
+              <a:t>Independence Day</a:t>
+            </a:r>
+            <a:endParaRPr lang="en-CA" sz="3200" dirty="0" smtClean="0">
+              <a:effectLst/>
+              <a:latin typeface="Calibri" panose="020F0502020204030204" pitchFamily="34" charset="0"/>
+              <a:ea typeface="Calibri" panose="020F0502020204030204" pitchFamily="34" charset="0"/>
+              <a:cs typeface="Times New Roman" panose="02020603050405020304" pitchFamily="18" charset="0"/>
+            </a:endParaRPr>
+          </a:p>
+          <a:p>
+            <a:pPr marL="285750" lvl="0" indent="-285750" algn="just">
+              <a:buFont typeface="Arial" panose="020B0604020202020204" pitchFamily="34" charset="0"/>
+              <a:buChar char="•"/>
+            </a:pPr>
+            <a:r>
+              <a:rPr lang="en-US" sz="2800" dirty="0" smtClean="0"/>
+              <a:t>Overview	:	Defend </a:t>
+            </a:r>
+            <a:r>
+              <a:rPr lang="en-US" sz="2800" dirty="0"/>
+              <a:t>Earth from alien invasions in a </a:t>
+            </a:r>
+            <a:r>
+              <a:rPr lang="en-US" sz="2800" dirty="0" smtClean="0"/>
+              <a:t>			spaceship</a:t>
+            </a:r>
+            <a:r>
+              <a:rPr lang="en-US" sz="2800" dirty="0"/>
+              <a:t>.</a:t>
+            </a:r>
+            <a:endParaRPr lang="en-CA" sz="2800" dirty="0"/>
+          </a:p>
+          <a:p>
+            <a:pPr marL="285750" lvl="0" indent="-285750" algn="just">
+              <a:buFont typeface="Arial" panose="020B0604020202020204" pitchFamily="34" charset="0"/>
+              <a:buChar char="•"/>
+            </a:pPr>
+            <a:r>
+              <a:rPr lang="en-US" sz="2800" dirty="0" smtClean="0"/>
+              <a:t>Gameplay	: 	Move </a:t>
+            </a:r>
+            <a:r>
+              <a:rPr lang="en-US" sz="2800" dirty="0"/>
+              <a:t>left and right, shooting alien ships </a:t>
+            </a:r>
+            <a:r>
+              <a:rPr lang="en-US" sz="2800" dirty="0" smtClean="0"/>
+              <a:t>			before </a:t>
+            </a:r>
+            <a:r>
+              <a:rPr lang="en-US" sz="2800" dirty="0"/>
+              <a:t>they reach the planet.</a:t>
+            </a:r>
+            <a:endParaRPr lang="en-CA" sz="2800" dirty="0"/>
+          </a:p>
+          <a:p>
+            <a:pPr marL="285750" lvl="0" indent="-285750" algn="just">
+              <a:buFont typeface="Arial" panose="020B0604020202020204" pitchFamily="34" charset="0"/>
+              <a:buChar char="•"/>
+            </a:pPr>
+            <a:r>
+              <a:rPr lang="en-US" sz="2800" dirty="0" smtClean="0"/>
+              <a:t>Challenges: 	Aliens </a:t>
+            </a:r>
+            <a:r>
+              <a:rPr lang="en-US" sz="2800" dirty="0"/>
+              <a:t>get faster, fire back, and drop </a:t>
+            </a:r>
+            <a:r>
+              <a:rPr lang="en-US" sz="2800" dirty="0" smtClean="0"/>
+              <a:t>power-			ups </a:t>
+            </a:r>
+            <a:r>
+              <a:rPr lang="en-US" sz="2800" dirty="0"/>
+              <a:t>like shields or bombs.</a:t>
+            </a:r>
+            <a:endParaRPr lang="en-CA" sz="2800" dirty="0"/>
+          </a:p>
+          <a:p>
+            <a:pPr marL="285750" lvl="0" indent="-285750" algn="just">
+              <a:buFont typeface="Arial" panose="020B0604020202020204" pitchFamily="34" charset="0"/>
+              <a:buChar char="•"/>
+            </a:pPr>
+            <a:r>
+              <a:rPr lang="en-US" sz="2800" dirty="0" smtClean="0"/>
+              <a:t>Scoring	: 	Earn </a:t>
+            </a:r>
+            <a:r>
+              <a:rPr lang="en-US" sz="2800" dirty="0"/>
+              <a:t>points for destroying ships and </a:t>
+            </a:r>
+            <a:r>
+              <a:rPr lang="en-US" sz="2800" dirty="0" smtClean="0"/>
+              <a:t>				completing </a:t>
+            </a:r>
+            <a:r>
+              <a:rPr lang="en-US" sz="2800" dirty="0"/>
+              <a:t>waves quickly.</a:t>
+            </a:r>
+            <a:endParaRPr lang="en-CA" sz="2800" dirty="0"/>
+          </a:p>
+          <a:p>
+            <a:pPr marL="285750" lvl="0" indent="-285750" algn="just">
+              <a:buFont typeface="Arial" panose="020B0604020202020204" pitchFamily="34" charset="0"/>
+              <a:buChar char="•"/>
+            </a:pPr>
+            <a:r>
+              <a:rPr lang="en-US" sz="2800" dirty="0" smtClean="0"/>
+              <a:t>Goal	: 	Survive </a:t>
+            </a:r>
+            <a:r>
+              <a:rPr lang="en-US" sz="2800" dirty="0"/>
+              <a:t>waves, protect Earth, and achieve </a:t>
+            </a:r>
+            <a:r>
+              <a:rPr lang="en-US" sz="2800" dirty="0" smtClean="0"/>
+              <a:t>			the </a:t>
+            </a:r>
+            <a:r>
+              <a:rPr lang="en-US" sz="2800" dirty="0"/>
+              <a:t>highest score.</a:t>
+            </a:r>
+            <a:endParaRPr lang="en-CA" sz="2800" dirty="0"/>
+          </a:p>
+        </p:txBody>
+      </p:sp>
+    </p:spTree>
+    <p:extLst>
+      <p:ext uri="{BB962C8B-B14F-4D97-AF65-F5344CB8AC3E}">
+        <p14:creationId xmlns:p14="http://schemas.microsoft.com/office/powerpoint/2010/main" val="2581456538"/>
+      </p:ext>
+    </p:extLst>
+  </p:cSld>
+  <p:clrMapOvr>
+    <a:masterClrMapping/>
+  </p:clrMapOvr>
+  <p:timing>
+    <p:tnLst>
+      <p:par>
+        <p:cTn id="1" dur="indefinite" restart="never" nodeType="tmRoot"/>
+      </p:par>
+    </p:tnLst>
+  </p:timing>
+</p:sld>
+</file>
+
+<file path=ppt/slides/slide9.xml><?xml version="1.0" encoding="utf-8"?>
+<p:sld xmlns:a="http://schemas.openxmlformats.org/drawingml/2006/main" xmlns:r="http://schemas.openxmlformats.org/officeDocument/2006/relationships" xmlns:p="http://schemas.openxmlformats.org/presentationml/2006/main">
+  <p:cSld>
+    <p:spTree>
+      <p:nvGrpSpPr>
+        <p:cNvPr id="1" name=""/>
+        <p:cNvGrpSpPr/>
+        <p:nvPr/>
+      </p:nvGrpSpPr>
+      <p:grpSpPr>
+        <a:xfrm>
+          <a:off x="0" y="0"/>
+          <a:ext cx="0" cy="0"/>
+          <a:chOff x="0" y="0"/>
+          <a:chExt cx="0" cy="0"/>
+        </a:xfrm>
+      </p:grpSpPr>
+      <p:sp>
+        <p:nvSpPr>
+          <p:cNvPr id="4" name="Rectangle 3"/>
+          <p:cNvSpPr/>
+          <p:nvPr/>
+        </p:nvSpPr>
+        <p:spPr>
+          <a:xfrm>
+            <a:off x="1680594" y="539653"/>
+            <a:ext cx="9308983" cy="595932"/>
+          </a:xfrm>
+          <a:prstGeom prst="rect">
+            <a:avLst/>
+          </a:prstGeom>
+        </p:spPr>
+        <p:txBody>
+          <a:bodyPr wrap="square">
+            <a:spAutoFit/>
+          </a:bodyPr>
+          <a:lstStyle/>
+          <a:p>
+            <a:pPr algn="ctr">
+              <a:lnSpc>
+                <a:spcPct val="107000"/>
+              </a:lnSpc>
+              <a:spcAft>
+                <a:spcPts val="0"/>
+              </a:spcAft>
+            </a:pPr>
+            <a:r>
+              <a:rPr lang="en-CA" sz="3200" b="1" dirty="0" smtClean="0">
+                <a:effectLst/>
+                <a:latin typeface="Calibri" panose="020F0502020204030204" pitchFamily="34" charset="0"/>
+                <a:ea typeface="Times New Roman" panose="02020603050405020304" pitchFamily="18" charset="0"/>
+                <a:cs typeface="Calibri" panose="020F0502020204030204" pitchFamily="34" charset="0"/>
+              </a:rPr>
+              <a:t>Independence Day</a:t>
+            </a:r>
+            <a:endParaRPr lang="en-CA" sz="3200" dirty="0" smtClean="0">
+              <a:effectLst/>
+              <a:latin typeface="Calibri" panose="020F0502020204030204" pitchFamily="34" charset="0"/>
+              <a:ea typeface="Calibri" panose="020F0502020204030204" pitchFamily="34" charset="0"/>
+              <a:cs typeface="Times New Roman" panose="02020603050405020304" pitchFamily="18" charset="0"/>
+            </a:endParaRPr>
+          </a:p>
+        </p:txBody>
+      </p:sp>
+      <p:pic>
+        <p:nvPicPr>
+          <p:cNvPr id="2" name="Picture 1"/>
+          <p:cNvPicPr>
+            <a:picLocks noChangeAspect="1"/>
+          </p:cNvPicPr>
+          <p:nvPr/>
+        </p:nvPicPr>
+        <p:blipFill>
+          <a:blip r:embed="rId2"/>
+          <a:stretch>
+            <a:fillRect/>
+          </a:stretch>
+        </p:blipFill>
+        <p:spPr>
+          <a:xfrm>
+            <a:off x="3211580" y="1447628"/>
+            <a:ext cx="5768840" cy="3962743"/>
+          </a:xfrm>
+          <a:prstGeom prst="rect">
+            <a:avLst/>
+          </a:prstGeom>
+        </p:spPr>
+      </p:pic>
+    </p:spTree>
+    <p:extLst>
+      <p:ext uri="{BB962C8B-B14F-4D97-AF65-F5344CB8AC3E}">
+        <p14:creationId xmlns:p14="http://schemas.microsoft.com/office/powerpoint/2010/main" val="3954485573"/>
+      </p:ext>
+    </p:extLst>
+  </p:cSld>
+  <p:clrMapOvr>
+    <a:masterClrMapping/>
+  </p:clrMapOvr>
+  <p:timing>
+    <p:tnLst>
+      <p:par>
+        <p:cTn id="1" dur="indefinite" restart="never" nodeType="tmRoot"/>
+      </p:par>
+    </p:tnLst>
+  </p:timing>
 </p:sld>
 </file>
 

</xml_diff>